<commit_message>
Corrección de errores de la presentación
</commit_message>
<xml_diff>
--- a/Ejercicios de clase/Symbols.pptx
+++ b/Ejercicios de clase/Symbols.pptx
@@ -35,13 +35,13 @@
   <p:notesSz cx="6858000" cy="9144000"/>
   <p:embeddedFontLst>
     <p:embeddedFont>
-      <p:font typeface="Pangolin" panose="020B0604020202020204" charset="0"/>
+      <p:font typeface="Inconsolata" panose="020B0604020202020204" charset="0"/>
       <p:regular r:id="rId25"/>
+      <p:bold r:id="rId26"/>
     </p:embeddedFont>
     <p:embeddedFont>
-      <p:font typeface="Inconsolata" panose="020B0604020202020204" charset="0"/>
-      <p:regular r:id="rId26"/>
-      <p:bold r:id="rId27"/>
+      <p:font typeface="Pangolin" panose="020B0604020202020204" charset="0"/>
+      <p:regular r:id="rId27"/>
     </p:embeddedFont>
   </p:embeddedFontLst>
   <p:defaultTextStyle>
@@ -12135,7 +12135,29 @@
                 </a:solidFill>
                 <a:latin typeface="Pangolin" panose="020B0604020202020204" charset="0"/>
               </a:rPr>
-              <a:t> principals:</a:t>
+              <a:t> </a:t>
+            </a:r>
+            <a:r>
+              <a:rPr lang="en-US" sz="2000" dirty="0" err="1">
+                <a:solidFill>
+                  <a:schemeClr val="accent1">
+                    <a:lumMod val="75000"/>
+                  </a:schemeClr>
+                </a:solidFill>
+                <a:latin typeface="Pangolin" panose="020B0604020202020204" charset="0"/>
+              </a:rPr>
+              <a:t>principales</a:t>
+            </a:r>
+            <a:r>
+              <a:rPr lang="en-US" sz="2000" dirty="0">
+                <a:solidFill>
+                  <a:schemeClr val="accent1">
+                    <a:lumMod val="75000"/>
+                  </a:schemeClr>
+                </a:solidFill>
+                <a:latin typeface="Pangolin" panose="020B0604020202020204" charset="0"/>
+              </a:rPr>
+              <a:t>:</a:t>
             </a:r>
           </a:p>
           <a:p>
@@ -12292,7 +12314,7 @@
                 <a:latin typeface="Pangolin" panose="020B0604020202020204" charset="0"/>
                 <a:sym typeface="Wingdings" panose="05000000000000000000" pitchFamily="2" charset="2"/>
               </a:rPr>
-              <a:t> que no van a </a:t>
+              <a:t> que no van a 	</a:t>
             </a:r>
             <a:r>
               <a:rPr lang="en-US" sz="2000" dirty="0" err="1">

</xml_diff>

<commit_message>
Corrección de erratas en la presentación
</commit_message>
<xml_diff>
--- a/Ejercicios de clase/Symbols.pptx
+++ b/Ejercicios de clase/Symbols.pptx
@@ -4758,7 +4758,7 @@
         </p:blipFill>
         <p:spPr>
           <a:xfrm>
-            <a:off x="3933416" y="1150650"/>
+            <a:off x="3919240" y="1150650"/>
             <a:ext cx="4309484" cy="2733606"/>
           </a:xfrm>
           <a:prstGeom prst="rect">
@@ -5930,8 +5930,8 @@
         </p:blipFill>
         <p:spPr>
           <a:xfrm>
-            <a:off x="4209691" y="1360148"/>
-            <a:ext cx="3899139" cy="2469980"/>
+            <a:off x="4209691" y="1360147"/>
+            <a:ext cx="3906528" cy="2474661"/>
           </a:xfrm>
           <a:prstGeom prst="rect">
             <a:avLst/>
@@ -7134,8 +7134,8 @@
         </p:blipFill>
         <p:spPr>
           <a:xfrm>
-            <a:off x="4209691" y="1373143"/>
-            <a:ext cx="3916392" cy="2456985"/>
+            <a:off x="4202602" y="1373143"/>
+            <a:ext cx="3935153" cy="2468755"/>
           </a:xfrm>
           <a:prstGeom prst="rect">
             <a:avLst/>
@@ -8320,7 +8320,7 @@
         </p:blipFill>
         <p:spPr>
           <a:xfrm>
-            <a:off x="4226942" y="1356234"/>
+            <a:off x="4226942" y="1363322"/>
             <a:ext cx="3897799" cy="2473894"/>
           </a:xfrm>
           <a:prstGeom prst="rect">
@@ -10668,8 +10668,8 @@
         </p:blipFill>
         <p:spPr>
           <a:xfrm>
-            <a:off x="4217694" y="1380226"/>
-            <a:ext cx="3887123" cy="2449902"/>
+            <a:off x="4217694" y="1366050"/>
+            <a:ext cx="3919757" cy="2470470"/>
           </a:xfrm>
           <a:prstGeom prst="rect">
             <a:avLst/>
@@ -14791,13 +14791,13 @@
               <a:t> Se añade una capa oculta a los </a:t>
             </a:r>
             <a:r>
-              <a:rPr lang="es-ES" dirty="0" err="1">
+              <a:rPr lang="es-ES">
                 <a:solidFill>
                   <a:schemeClr val="bg2"/>
                 </a:solidFill>
                 <a:sym typeface="Wingdings" panose="05000000000000000000" pitchFamily="2" charset="2"/>
               </a:rPr>
-              <a:t>Objectos</a:t>
+              <a:t>Objects</a:t>
             </a:r>
             <a:endParaRPr lang="es-ES" dirty="0">
               <a:solidFill>

</xml_diff>